<commit_message>
updated powerpoint and deleted 2 unnecesarry lines of code
</commit_message>
<xml_diff>
--- a/Resources/NESDinoGame.pptx
+++ b/Resources/NESDinoGame.pptx
@@ -631,7 +631,37 @@
           <a:bodyPr/>
           <a:lstStyle/>
           <a:p>
+            <a:r>
+              <a:rPr lang="en-GB" dirty="0"/>
+              <a:t>The seed is calculated by the time it takes from startup of the game to pressing the jump </a:t>
+            </a:r>
+          </a:p>
+          <a:p>
+            <a:r>
+              <a:rPr lang="en-GB" dirty="0"/>
+              <a:t>The rand function concept is called Linear-Feedback- Shift Register</a:t>
+            </a:r>
+          </a:p>
+          <a:p>
+            <a:r>
+              <a:rPr lang="en-GB" dirty="0"/>
+              <a:t>It return 2 8-bit numbers</a:t>
+            </a:r>
+          </a:p>
+          <a:p>
+            <a:r>
+              <a:rPr lang="en-GB" dirty="0"/>
+              <a:t>One returns in the A register the other in Y register</a:t>
+            </a:r>
+          </a:p>
+          <a:p>
             <a:endParaRPr lang="en-GB" dirty="0"/>
+          </a:p>
+          <a:p>
+            <a:r>
+              <a:rPr lang="en-GB" dirty="0"/>
+              <a:t>It’s basically the randomization from in the book</a:t>
+            </a:r>
           </a:p>
         </p:txBody>
       </p:sp>
@@ -739,7 +769,22 @@
           <a:bodyPr/>
           <a:lstStyle/>
           <a:p>
-            <a:endParaRPr lang="en-GB" dirty="0"/>
+            <a:r>
+              <a:rPr lang="en-GB" dirty="0"/>
+              <a:t>If the lowest bit only is set a bird spawns</a:t>
+            </a:r>
+          </a:p>
+          <a:p>
+            <a:r>
+              <a:rPr lang="en-GB" dirty="0"/>
+              <a:t>If the second bit only is set 2 cacti spawn</a:t>
+            </a:r>
+          </a:p>
+          <a:p>
+            <a:r>
+              <a:rPr lang="en-GB" dirty="0"/>
+              <a:t>and if both bits or no bits are set a single cacti spawn</a:t>
+            </a:r>
           </a:p>
         </p:txBody>
       </p:sp>
@@ -8174,16 +8219,10 @@
               <a:buChar char="-"/>
             </a:pPr>
             <a:r>
-              <a:rPr lang="en-GB" dirty="0" err="1">
-                <a:latin typeface="Abadi" panose="020B0604020104020204" pitchFamily="34" charset="0"/>
-              </a:rPr>
-              <a:t>Yenzo</a:t>
-            </a:r>
-            <a:r>
               <a:rPr lang="en-GB" dirty="0">
                 <a:latin typeface="Abadi" panose="020B0604020104020204" pitchFamily="34" charset="0"/>
               </a:rPr>
-              <a:t> Devos)</a:t>
+              <a:t>Yenzo Devos</a:t>
             </a:r>
             <a:endParaRPr lang="nl-BE" dirty="0">
               <a:latin typeface="Abadi" panose="020B0604020104020204" pitchFamily="34" charset="0"/>
@@ -9278,11 +9317,95 @@
               <a:rPr lang="en-GB" dirty="0">
                 <a:latin typeface="Abadi" panose="020B0604020104020204" pitchFamily="34" charset="0"/>
               </a:rPr>
-              <a:t>YENZO (Explain how you did the random generation here)</a:t>
-            </a:r>
-          </a:p>
-        </p:txBody>
-      </p:sp>
+              <a:t>Seed calculated by starting game</a:t>
+            </a:r>
+          </a:p>
+          <a:p>
+            <a:r>
+              <a:rPr lang="en-GB" dirty="0">
+                <a:latin typeface="Abadi" panose="020B0604020104020204" pitchFamily="34" charset="0"/>
+              </a:rPr>
+              <a:t>Return 2 8bit-numbers</a:t>
+            </a:r>
+          </a:p>
+          <a:p>
+            <a:r>
+              <a:rPr lang="en-GB" dirty="0">
+                <a:latin typeface="Abadi" panose="020B0604020104020204" pitchFamily="34" charset="0"/>
+              </a:rPr>
+              <a:t>1 in A register</a:t>
+            </a:r>
+          </a:p>
+          <a:p>
+            <a:r>
+              <a:rPr lang="en-GB" dirty="0">
+                <a:latin typeface="Abadi" panose="020B0604020104020204" pitchFamily="34" charset="0"/>
+              </a:rPr>
+              <a:t>1 in Y register</a:t>
+            </a:r>
+          </a:p>
+        </p:txBody>
+      </p:sp>
+      <p:pic>
+        <p:nvPicPr>
+          <p:cNvPr id="7" name="Picture 6">
+            <a:extLst>
+              <a:ext uri="{FF2B5EF4-FFF2-40B4-BE49-F238E27FC236}">
+                <a16:creationId xmlns:a16="http://schemas.microsoft.com/office/drawing/2014/main" id="{00B57F45-9EC6-5350-363A-330B9FE8492B}"/>
+              </a:ext>
+            </a:extLst>
+          </p:cNvPr>
+          <p:cNvPicPr>
+            <a:picLocks noChangeAspect="1"/>
+          </p:cNvPicPr>
+          <p:nvPr/>
+        </p:nvPicPr>
+        <p:blipFill>
+          <a:blip r:embed="rId3"/>
+          <a:stretch>
+            <a:fillRect/>
+          </a:stretch>
+        </p:blipFill>
+        <p:spPr>
+          <a:xfrm>
+            <a:off x="7631848" y="3487758"/>
+            <a:ext cx="1773431" cy="2684441"/>
+          </a:xfrm>
+          <a:prstGeom prst="rect">
+            <a:avLst/>
+          </a:prstGeom>
+        </p:spPr>
+      </p:pic>
+      <p:pic>
+        <p:nvPicPr>
+          <p:cNvPr id="9" name="Picture 8">
+            <a:extLst>
+              <a:ext uri="{FF2B5EF4-FFF2-40B4-BE49-F238E27FC236}">
+                <a16:creationId xmlns:a16="http://schemas.microsoft.com/office/drawing/2014/main" id="{BACC42D3-06EF-331A-5DD2-9B79DB9E83B9}"/>
+              </a:ext>
+            </a:extLst>
+          </p:cNvPr>
+          <p:cNvPicPr>
+            <a:picLocks noChangeAspect="1"/>
+          </p:cNvPicPr>
+          <p:nvPr/>
+        </p:nvPicPr>
+        <p:blipFill>
+          <a:blip r:embed="rId4"/>
+          <a:stretch>
+            <a:fillRect/>
+          </a:stretch>
+        </p:blipFill>
+        <p:spPr>
+          <a:xfrm>
+            <a:off x="9945596" y="419253"/>
+            <a:ext cx="1557427" cy="5752947"/>
+          </a:xfrm>
+          <a:prstGeom prst="rect">
+            <a:avLst/>
+          </a:prstGeom>
+        </p:spPr>
+      </p:pic>
     </p:spTree>
     <p:extLst>
       <p:ext uri="{BB962C8B-B14F-4D97-AF65-F5344CB8AC3E}">
@@ -9611,11 +9734,49 @@
               <a:rPr lang="en-GB" dirty="0">
                 <a:latin typeface="Abadi" panose="020B0604020104020204" pitchFamily="34" charset="0"/>
               </a:rPr>
-              <a:t>YENZO (How did you use the random to choose obstacles?)</a:t>
-            </a:r>
-          </a:p>
-        </p:txBody>
-      </p:sp>
+              <a:t>Checks the 2 lowest bits</a:t>
+            </a:r>
+          </a:p>
+          <a:p>
+            <a:r>
+              <a:rPr lang="en-GB" dirty="0">
+                <a:latin typeface="Abadi" panose="020B0604020104020204" pitchFamily="34" charset="0"/>
+              </a:rPr>
+              <a:t>Spawn type of enemy in afterwards</a:t>
+            </a:r>
+          </a:p>
+        </p:txBody>
+      </p:sp>
+      <p:pic>
+        <p:nvPicPr>
+          <p:cNvPr id="5" name="Picture 4">
+            <a:extLst>
+              <a:ext uri="{FF2B5EF4-FFF2-40B4-BE49-F238E27FC236}">
+                <a16:creationId xmlns:a16="http://schemas.microsoft.com/office/drawing/2014/main" id="{C6FD841E-C179-F2AE-0B37-01B9172DA39A}"/>
+              </a:ext>
+            </a:extLst>
+          </p:cNvPr>
+          <p:cNvPicPr>
+            <a:picLocks noChangeAspect="1"/>
+          </p:cNvPicPr>
+          <p:nvPr/>
+        </p:nvPicPr>
+        <p:blipFill>
+          <a:blip r:embed="rId3"/>
+          <a:stretch>
+            <a:fillRect/>
+          </a:stretch>
+        </p:blipFill>
+        <p:spPr>
+          <a:xfrm>
+            <a:off x="8893036" y="685800"/>
+            <a:ext cx="2581635" cy="5163271"/>
+          </a:xfrm>
+          <a:prstGeom prst="rect">
+            <a:avLst/>
+          </a:prstGeom>
+        </p:spPr>
+      </p:pic>
     </p:spTree>
     <p:extLst>
       <p:ext uri="{BB962C8B-B14F-4D97-AF65-F5344CB8AC3E}">

</xml_diff>